<commit_message>
Added source citation to one of the slides
</commit_message>
<xml_diff>
--- a/Intro-slides-March18-2019.pptx
+++ b/Intro-slides-March18-2019.pptx
@@ -115,6 +115,11 @@
       </a:defRPr>
     </a:lvl9pPr>
   </p:defaultTextStyle>
+  <p:extLst>
+    <p:ext uri="{EFAFB233-063F-42B5-8137-9DF3F51BA10A}">
+      <p15:sldGuideLst xmlns:p15="http://schemas.microsoft.com/office/powerpoint/2012/main"/>
+    </p:ext>
+  </p:extLst>
 </p:presentation>
 </file>
 
@@ -4443,7 +4448,7 @@
               </a:lnSpc>
             </a:pPr>
             <a:r>
-              <a:rPr lang="en-US" dirty="0">
+              <a:rPr lang="en-US" b="1" dirty="0">
                 <a:highlight>
                   <a:scrgbClr r="0" g="0" b="0">
                     <a:alpha val="0"/>
@@ -4476,7 +4481,7 @@
         <p:spPr>
           <a:xfrm>
             <a:off x="358613" y="1195086"/>
-            <a:ext cx="8353080" cy="4708800"/>
+            <a:ext cx="11713782" cy="5471932"/>
           </a:xfrm>
           <a:noFill/>
           <a:ln>
@@ -4593,6 +4598,58 @@
               <a:latin typeface="Calibri" pitchFamily="34"/>
               <a:ea typeface="MS PGothic" pitchFamily="49"/>
             </a:endParaRPr>
+          </a:p>
+        </p:txBody>
+      </p:sp>
+      <p:sp>
+        <p:nvSpPr>
+          <p:cNvPr id="4" name="TextBox 3">
+            <a:extLst>
+              <a:ext uri="{FF2B5EF4-FFF2-40B4-BE49-F238E27FC236}">
+                <a16:creationId xmlns:a16="http://schemas.microsoft.com/office/drawing/2014/main" id="{47D0D3A9-FE97-6E44-B7F7-4256D1E67541}"/>
+              </a:ext>
+            </a:extLst>
+          </p:cNvPr>
+          <p:cNvSpPr txBox="1"/>
+          <p:nvPr/>
+        </p:nvSpPr>
+        <p:spPr>
+          <a:xfrm>
+            <a:off x="5557363" y="6193514"/>
+            <a:ext cx="6634637" cy="369332"/>
+          </a:xfrm>
+          <a:prstGeom prst="rect">
+            <a:avLst/>
+          </a:prstGeom>
+          <a:noFill/>
+        </p:spPr>
+        <p:txBody>
+          <a:bodyPr wrap="none" rtlCol="0">
+            <a:spAutoFit/>
+          </a:bodyPr>
+          <a:lstStyle/>
+          <a:p>
+            <a:r>
+              <a:rPr lang="en-US" b="1" dirty="0"/>
+              <a:t>Source:</a:t>
+            </a:r>
+            <a:r>
+              <a:rPr lang="en-US" dirty="0"/>
+              <a:t> Partially collected from https://</a:t>
+            </a:r>
+            <a:r>
+              <a:rPr lang="en-US" dirty="0" err="1"/>
+              <a:t>github.com</a:t>
+            </a:r>
+            <a:r>
+              <a:rPr lang="en-US" dirty="0"/>
+              <a:t>/</a:t>
+            </a:r>
+            <a:r>
+              <a:rPr lang="en-US" dirty="0" err="1"/>
+              <a:t>southampton-rsg</a:t>
+            </a:r>
+            <a:endParaRPr lang="en-US" dirty="0"/>
           </a:p>
         </p:txBody>
       </p:sp>

</xml_diff>